<commit_message>
add another version of mockup
</commit_message>
<xml_diff>
--- a/mockup_images/PageMocks.pptx
+++ b/mockup_images/PageMocks.pptx
@@ -291,7 +291,7 @@
           <a:p>
             <a:fld id="{F821B2E7-C6E1-384A-8717-A55EFFD45A61}" type="datetimeFigureOut">
               <a:rPr lang="en-US" smtClean="0"/>
-              <a:t>2/27/16</a:t>
+              <a:t>3/5/16</a:t>
             </a:fld>
             <a:endParaRPr lang="en-US"/>
           </a:p>
@@ -461,7 +461,7 @@
           <a:p>
             <a:fld id="{F821B2E7-C6E1-384A-8717-A55EFFD45A61}" type="datetimeFigureOut">
               <a:rPr lang="en-US" smtClean="0"/>
-              <a:t>2/27/16</a:t>
+              <a:t>3/5/16</a:t>
             </a:fld>
             <a:endParaRPr lang="en-US"/>
           </a:p>
@@ -641,7 +641,7 @@
           <a:p>
             <a:fld id="{F821B2E7-C6E1-384A-8717-A55EFFD45A61}" type="datetimeFigureOut">
               <a:rPr lang="en-US" smtClean="0"/>
-              <a:t>2/27/16</a:t>
+              <a:t>3/5/16</a:t>
             </a:fld>
             <a:endParaRPr lang="en-US"/>
           </a:p>
@@ -811,7 +811,7 @@
           <a:p>
             <a:fld id="{F821B2E7-C6E1-384A-8717-A55EFFD45A61}" type="datetimeFigureOut">
               <a:rPr lang="en-US" smtClean="0"/>
-              <a:t>2/27/16</a:t>
+              <a:t>3/5/16</a:t>
             </a:fld>
             <a:endParaRPr lang="en-US"/>
           </a:p>
@@ -1057,7 +1057,7 @@
           <a:p>
             <a:fld id="{F821B2E7-C6E1-384A-8717-A55EFFD45A61}" type="datetimeFigureOut">
               <a:rPr lang="en-US" smtClean="0"/>
-              <a:t>2/27/16</a:t>
+              <a:t>3/5/16</a:t>
             </a:fld>
             <a:endParaRPr lang="en-US"/>
           </a:p>
@@ -1345,7 +1345,7 @@
           <a:p>
             <a:fld id="{F821B2E7-C6E1-384A-8717-A55EFFD45A61}" type="datetimeFigureOut">
               <a:rPr lang="en-US" smtClean="0"/>
-              <a:t>2/27/16</a:t>
+              <a:t>3/5/16</a:t>
             </a:fld>
             <a:endParaRPr lang="en-US"/>
           </a:p>
@@ -1767,7 +1767,7 @@
           <a:p>
             <a:fld id="{F821B2E7-C6E1-384A-8717-A55EFFD45A61}" type="datetimeFigureOut">
               <a:rPr lang="en-US" smtClean="0"/>
-              <a:t>2/27/16</a:t>
+              <a:t>3/5/16</a:t>
             </a:fld>
             <a:endParaRPr lang="en-US"/>
           </a:p>
@@ -1885,7 +1885,7 @@
           <a:p>
             <a:fld id="{F821B2E7-C6E1-384A-8717-A55EFFD45A61}" type="datetimeFigureOut">
               <a:rPr lang="en-US" smtClean="0"/>
-              <a:t>2/27/16</a:t>
+              <a:t>3/5/16</a:t>
             </a:fld>
             <a:endParaRPr lang="en-US"/>
           </a:p>
@@ -1980,7 +1980,7 @@
           <a:p>
             <a:fld id="{F821B2E7-C6E1-384A-8717-A55EFFD45A61}" type="datetimeFigureOut">
               <a:rPr lang="en-US" smtClean="0"/>
-              <a:t>2/27/16</a:t>
+              <a:t>3/5/16</a:t>
             </a:fld>
             <a:endParaRPr lang="en-US"/>
           </a:p>
@@ -2257,7 +2257,7 @@
           <a:p>
             <a:fld id="{F821B2E7-C6E1-384A-8717-A55EFFD45A61}" type="datetimeFigureOut">
               <a:rPr lang="en-US" smtClean="0"/>
-              <a:t>2/27/16</a:t>
+              <a:t>3/5/16</a:t>
             </a:fld>
             <a:endParaRPr lang="en-US"/>
           </a:p>
@@ -2510,7 +2510,7 @@
           <a:p>
             <a:fld id="{F821B2E7-C6E1-384A-8717-A55EFFD45A61}" type="datetimeFigureOut">
               <a:rPr lang="en-US" smtClean="0"/>
-              <a:t>2/27/16</a:t>
+              <a:t>3/5/16</a:t>
             </a:fld>
             <a:endParaRPr lang="en-US"/>
           </a:p>
@@ -2723,7 +2723,7 @@
           <a:p>
             <a:fld id="{F821B2E7-C6E1-384A-8717-A55EFFD45A61}" type="datetimeFigureOut">
               <a:rPr lang="en-US" smtClean="0"/>
-              <a:t>2/27/16</a:t>
+              <a:t>3/5/16</a:t>
             </a:fld>
             <a:endParaRPr lang="en-US"/>
           </a:p>
@@ -5439,505 +5439,16 @@
           </a:p>
         </p:txBody>
       </p:sp>
-      <p:grpSp>
-        <p:nvGrpSpPr>
-          <p:cNvPr id="21" name="Group 20"/>
-          <p:cNvGrpSpPr/>
-          <p:nvPr/>
-        </p:nvGrpSpPr>
-        <p:grpSpPr>
-          <a:xfrm>
-            <a:off x="86670" y="5455105"/>
-            <a:ext cx="3843889" cy="1381723"/>
-            <a:chOff x="0" y="4409197"/>
-            <a:chExt cx="3843889" cy="1381723"/>
-          </a:xfrm>
-        </p:grpSpPr>
-        <p:grpSp>
-          <p:nvGrpSpPr>
-            <p:cNvPr id="14" name="Group 13"/>
-            <p:cNvGrpSpPr/>
-            <p:nvPr/>
-          </p:nvGrpSpPr>
-          <p:grpSpPr>
-            <a:xfrm>
-              <a:off x="468261" y="4409197"/>
-              <a:ext cx="3375628" cy="1381723"/>
-              <a:chOff x="330701" y="3718336"/>
-              <a:chExt cx="3947881" cy="1725006"/>
-            </a:xfrm>
-          </p:grpSpPr>
-          <p:sp>
-            <p:nvSpPr>
-              <p:cNvPr id="10" name="Oval 9"/>
-              <p:cNvSpPr/>
-              <p:nvPr/>
-            </p:nvSpPr>
-            <p:spPr>
-              <a:xfrm>
-                <a:off x="330701" y="3718336"/>
-                <a:ext cx="1801482" cy="1725006"/>
-              </a:xfrm>
-              <a:prstGeom prst="ellipse">
-                <a:avLst/>
-              </a:prstGeom>
-            </p:spPr>
-            <p:style>
-              <a:lnRef idx="1">
-                <a:schemeClr val="accent1"/>
-              </a:lnRef>
-              <a:fillRef idx="3">
-                <a:schemeClr val="accent1"/>
-              </a:fillRef>
-              <a:effectRef idx="2">
-                <a:schemeClr val="accent1"/>
-              </a:effectRef>
-              <a:fontRef idx="minor">
-                <a:schemeClr val="lt1"/>
-              </a:fontRef>
-            </p:style>
-            <p:txBody>
-              <a:bodyPr rtlCol="0" anchor="ctr"/>
-              <a:lstStyle/>
-              <a:p>
-                <a:pPr algn="ctr"/>
-                <a:r>
-                  <a:rPr lang="en-US" sz="1400" dirty="0" smtClean="0"/>
-                  <a:t>Send</a:t>
-                </a:r>
-              </a:p>
-              <a:p>
-                <a:pPr algn="ctr"/>
-                <a:r>
-                  <a:rPr lang="en-US" sz="1400" dirty="0" smtClean="0"/>
-                  <a:t>Header</a:t>
-                </a:r>
-                <a:endParaRPr lang="en-US" sz="1400" dirty="0" smtClean="0"/>
-              </a:p>
-              <a:p>
-                <a:pPr algn="ctr"/>
-                <a:endParaRPr lang="en-US" sz="1400" dirty="0" smtClean="0"/>
-              </a:p>
-            </p:txBody>
-          </p:sp>
-          <p:sp>
-            <p:nvSpPr>
-              <p:cNvPr id="11" name="Oval 10"/>
-              <p:cNvSpPr/>
-              <p:nvPr/>
-            </p:nvSpPr>
-            <p:spPr>
-              <a:xfrm>
-                <a:off x="3239652" y="4064140"/>
-                <a:ext cx="1038930" cy="1035919"/>
-              </a:xfrm>
-              <a:prstGeom prst="ellipse">
-                <a:avLst/>
-              </a:prstGeom>
-            </p:spPr>
-            <p:style>
-              <a:lnRef idx="1">
-                <a:schemeClr val="accent1"/>
-              </a:lnRef>
-              <a:fillRef idx="3">
-                <a:schemeClr val="accent1"/>
-              </a:fillRef>
-              <a:effectRef idx="2">
-                <a:schemeClr val="accent1"/>
-              </a:effectRef>
-              <a:fontRef idx="minor">
-                <a:schemeClr val="lt1"/>
-              </a:fontRef>
-            </p:style>
-            <p:txBody>
-              <a:bodyPr rtlCol="0" anchor="ctr"/>
-              <a:lstStyle/>
-              <a:p>
-                <a:pPr algn="ctr"/>
-                <a:r>
-                  <a:rPr lang="en-US" sz="1000" dirty="0" smtClean="0"/>
-                  <a:t>Update</a:t>
-                </a:r>
-              </a:p>
-              <a:p>
-                <a:pPr algn="ctr"/>
-                <a:r>
-                  <a:rPr lang="en-US" sz="1000" dirty="0" smtClean="0"/>
-                  <a:t>Settings</a:t>
-                </a:r>
-                <a:endParaRPr lang="en-US" sz="1000" dirty="0" smtClean="0"/>
-              </a:p>
-              <a:p>
-                <a:pPr algn="ctr"/>
-                <a:endParaRPr lang="en-US" sz="1000" dirty="0" smtClean="0"/>
-              </a:p>
-            </p:txBody>
-          </p:sp>
-          <p:sp>
-            <p:nvSpPr>
-              <p:cNvPr id="12" name="Oval 11"/>
-              <p:cNvSpPr/>
-              <p:nvPr/>
-            </p:nvSpPr>
-            <p:spPr>
-              <a:xfrm>
-                <a:off x="2132183" y="4064141"/>
-                <a:ext cx="1107469" cy="1035918"/>
-              </a:xfrm>
-              <a:prstGeom prst="ellipse">
-                <a:avLst/>
-              </a:prstGeom>
-            </p:spPr>
-            <p:style>
-              <a:lnRef idx="1">
-                <a:schemeClr val="accent1"/>
-              </a:lnRef>
-              <a:fillRef idx="3">
-                <a:schemeClr val="accent1"/>
-              </a:fillRef>
-              <a:effectRef idx="2">
-                <a:schemeClr val="accent1"/>
-              </a:effectRef>
-              <a:fontRef idx="minor">
-                <a:schemeClr val="lt1"/>
-              </a:fontRef>
-            </p:style>
-            <p:txBody>
-              <a:bodyPr rtlCol="0" anchor="ctr"/>
-              <a:lstStyle/>
-              <a:p>
-                <a:pPr algn="ctr"/>
-                <a:r>
-                  <a:rPr lang="en-US" sz="1000" dirty="0" smtClean="0"/>
-                  <a:t>Update</a:t>
-                </a:r>
-              </a:p>
-              <a:p>
-                <a:pPr algn="ctr"/>
-                <a:r>
-                  <a:rPr lang="en-US" sz="1000" dirty="0" smtClean="0"/>
-                  <a:t>Settings</a:t>
-                </a:r>
-                <a:br>
-                  <a:rPr lang="en-US" sz="1000" dirty="0" smtClean="0"/>
-                </a:br>
-                <a:r>
-                  <a:rPr lang="en-US" sz="1000" dirty="0" smtClean="0"/>
-                  <a:t>Window</a:t>
-                </a:r>
-                <a:endParaRPr lang="en-US" sz="1000" dirty="0" smtClean="0"/>
-              </a:p>
-              <a:p>
-                <a:pPr algn="ctr"/>
-                <a:endParaRPr lang="en-US" sz="1000" dirty="0" smtClean="0"/>
-              </a:p>
-            </p:txBody>
-          </p:sp>
-        </p:grpSp>
-        <p:sp>
-          <p:nvSpPr>
-            <p:cNvPr id="18" name="TextBox 17"/>
-            <p:cNvSpPr txBox="1"/>
-            <p:nvPr/>
-          </p:nvSpPr>
-          <p:spPr>
-            <a:xfrm>
-              <a:off x="0" y="5050737"/>
-              <a:ext cx="435636" cy="246221"/>
-            </a:xfrm>
-            <a:prstGeom prst="rect">
-              <a:avLst/>
-            </a:prstGeom>
-            <a:noFill/>
-          </p:spPr>
-          <p:txBody>
-            <a:bodyPr wrap="none" rtlCol="0">
-              <a:spAutoFit/>
-            </a:bodyPr>
-            <a:lstStyle/>
-            <a:p>
-              <a:r>
-                <a:rPr lang="en-US" sz="1000" dirty="0" smtClean="0"/>
-                <a:t>Start</a:t>
-              </a:r>
-              <a:endParaRPr lang="en-US" sz="1000" dirty="0"/>
-            </a:p>
-          </p:txBody>
-        </p:sp>
-      </p:grpSp>
-      <p:grpSp>
-        <p:nvGrpSpPr>
-          <p:cNvPr id="22" name="Group 21"/>
-          <p:cNvGrpSpPr/>
-          <p:nvPr/>
-        </p:nvGrpSpPr>
-        <p:grpSpPr>
-          <a:xfrm>
-            <a:off x="3914641" y="4219019"/>
-            <a:ext cx="5229359" cy="1540399"/>
-            <a:chOff x="3986472" y="2540801"/>
-            <a:chExt cx="5229359" cy="1540399"/>
-          </a:xfrm>
-        </p:grpSpPr>
-        <p:grpSp>
-          <p:nvGrpSpPr>
-            <p:cNvPr id="13" name="Group 12"/>
-            <p:cNvGrpSpPr/>
-            <p:nvPr/>
-          </p:nvGrpSpPr>
-          <p:grpSpPr>
-            <a:xfrm>
-              <a:off x="3986472" y="2540801"/>
-              <a:ext cx="4655276" cy="1540399"/>
-              <a:chOff x="2345309" y="1060738"/>
-              <a:chExt cx="5688360" cy="2101807"/>
-            </a:xfrm>
-          </p:grpSpPr>
-          <p:sp>
-            <p:nvSpPr>
-              <p:cNvPr id="4" name="Oval 3"/>
-              <p:cNvSpPr/>
-              <p:nvPr/>
-            </p:nvSpPr>
-            <p:spPr>
-              <a:xfrm>
-                <a:off x="7000585" y="1622146"/>
-                <a:ext cx="1033084" cy="1019624"/>
-              </a:xfrm>
-              <a:prstGeom prst="ellipse">
-                <a:avLst/>
-              </a:prstGeom>
-            </p:spPr>
-            <p:style>
-              <a:lnRef idx="2">
-                <a:schemeClr val="accent3">
-                  <a:shade val="50000"/>
-                </a:schemeClr>
-              </a:lnRef>
-              <a:fillRef idx="1">
-                <a:schemeClr val="accent3"/>
-              </a:fillRef>
-              <a:effectRef idx="0">
-                <a:schemeClr val="accent3"/>
-              </a:effectRef>
-              <a:fontRef idx="minor">
-                <a:schemeClr val="lt1"/>
-              </a:fontRef>
-            </p:style>
-            <p:txBody>
-              <a:bodyPr rtlCol="0" anchor="ctr"/>
-              <a:lstStyle/>
-              <a:p>
-                <a:pPr algn="ctr"/>
-                <a:r>
-                  <a:rPr lang="en-US" dirty="0" smtClean="0"/>
-                  <a:t>Ping</a:t>
-                </a:r>
-              </a:p>
-              <a:p>
-                <a:pPr algn="ctr"/>
-                <a:endParaRPr lang="en-US" dirty="0"/>
-              </a:p>
-            </p:txBody>
-          </p:sp>
-          <p:sp>
-            <p:nvSpPr>
-              <p:cNvPr id="5" name="Oval 4"/>
-              <p:cNvSpPr/>
-              <p:nvPr/>
-            </p:nvSpPr>
-            <p:spPr>
-              <a:xfrm>
-                <a:off x="3378393" y="1371703"/>
-                <a:ext cx="1461305" cy="1509848"/>
-              </a:xfrm>
-              <a:prstGeom prst="ellipse">
-                <a:avLst/>
-              </a:prstGeom>
-            </p:spPr>
-            <p:style>
-              <a:lnRef idx="2">
-                <a:schemeClr val="accent3">
-                  <a:shade val="50000"/>
-                </a:schemeClr>
-              </a:lnRef>
-              <a:fillRef idx="1">
-                <a:schemeClr val="accent3"/>
-              </a:fillRef>
-              <a:effectRef idx="0">
-                <a:schemeClr val="accent3"/>
-              </a:effectRef>
-              <a:fontRef idx="minor">
-                <a:schemeClr val="lt1"/>
-              </a:fontRef>
-            </p:style>
-            <p:txBody>
-              <a:bodyPr rtlCol="0" anchor="ctr"/>
-              <a:lstStyle/>
-              <a:p>
-                <a:pPr algn="ctr"/>
-                <a:r>
-                  <a:rPr lang="en-US" sz="1400" dirty="0" smtClean="0"/>
-                  <a:t>Send</a:t>
-                </a:r>
-              </a:p>
-              <a:p>
-                <a:pPr algn="ctr"/>
-                <a:r>
-                  <a:rPr lang="en-US" sz="1400" dirty="0" smtClean="0"/>
-                  <a:t>Header</a:t>
-                </a:r>
-                <a:endParaRPr lang="en-US" sz="1400" dirty="0" smtClean="0"/>
-              </a:p>
-              <a:p>
-                <a:pPr algn="ctr"/>
-                <a:endParaRPr lang="en-US" sz="1400" dirty="0" smtClean="0"/>
-              </a:p>
-            </p:txBody>
-          </p:sp>
-          <p:sp>
-            <p:nvSpPr>
-              <p:cNvPr id="6" name="Oval 5"/>
-              <p:cNvSpPr/>
-              <p:nvPr/>
-            </p:nvSpPr>
-            <p:spPr>
-              <a:xfrm>
-                <a:off x="4839698" y="1060738"/>
-                <a:ext cx="2160887" cy="2101807"/>
-              </a:xfrm>
-              <a:prstGeom prst="ellipse">
-                <a:avLst/>
-              </a:prstGeom>
-            </p:spPr>
-            <p:style>
-              <a:lnRef idx="2">
-                <a:schemeClr val="accent3">
-                  <a:shade val="50000"/>
-                </a:schemeClr>
-              </a:lnRef>
-              <a:fillRef idx="1">
-                <a:schemeClr val="accent3"/>
-              </a:fillRef>
-              <a:effectRef idx="0">
-                <a:schemeClr val="accent3"/>
-              </a:effectRef>
-              <a:fontRef idx="minor">
-                <a:schemeClr val="lt1"/>
-              </a:fontRef>
-            </p:style>
-            <p:txBody>
-              <a:bodyPr rtlCol="0" anchor="ctr"/>
-              <a:lstStyle/>
-              <a:p>
-                <a:pPr algn="ctr"/>
-                <a:r>
-                  <a:rPr lang="en-US" dirty="0" smtClean="0"/>
-                  <a:t>Data</a:t>
-                </a:r>
-              </a:p>
-              <a:p>
-                <a:pPr algn="ctr"/>
-                <a:endParaRPr lang="en-US" dirty="0"/>
-              </a:p>
-            </p:txBody>
-          </p:sp>
-          <p:sp>
-            <p:nvSpPr>
-              <p:cNvPr id="7" name="Oval 6"/>
-              <p:cNvSpPr/>
-              <p:nvPr/>
-            </p:nvSpPr>
-            <p:spPr>
-              <a:xfrm>
-                <a:off x="2345309" y="1622146"/>
-                <a:ext cx="1033084" cy="1019624"/>
-              </a:xfrm>
-              <a:prstGeom prst="ellipse">
-                <a:avLst/>
-              </a:prstGeom>
-            </p:spPr>
-            <p:style>
-              <a:lnRef idx="2">
-                <a:schemeClr val="accent3">
-                  <a:shade val="50000"/>
-                </a:schemeClr>
-              </a:lnRef>
-              <a:fillRef idx="1">
-                <a:schemeClr val="accent3"/>
-              </a:fillRef>
-              <a:effectRef idx="0">
-                <a:schemeClr val="accent3"/>
-              </a:effectRef>
-              <a:fontRef idx="minor">
-                <a:schemeClr val="lt1"/>
-              </a:fontRef>
-            </p:style>
-            <p:txBody>
-              <a:bodyPr rtlCol="0" anchor="ctr"/>
-              <a:lstStyle/>
-              <a:p>
-                <a:pPr algn="ctr"/>
-                <a:r>
-                  <a:rPr lang="en-US" sz="1000" dirty="0" smtClean="0"/>
-                  <a:t>Update Setting</a:t>
-                </a:r>
-                <a:endParaRPr lang="en-US" sz="1000" dirty="0" smtClean="0"/>
-              </a:p>
-              <a:p>
-                <a:pPr algn="ctr"/>
-                <a:endParaRPr lang="en-US" sz="1000" dirty="0"/>
-              </a:p>
-            </p:txBody>
-          </p:sp>
-        </p:grpSp>
-        <p:sp>
-          <p:nvSpPr>
-            <p:cNvPr id="19" name="TextBox 18"/>
-            <p:cNvSpPr txBox="1"/>
-            <p:nvPr/>
-          </p:nvSpPr>
-          <p:spPr>
-            <a:xfrm>
-              <a:off x="8641748" y="3168815"/>
-              <a:ext cx="574083" cy="400110"/>
-            </a:xfrm>
-            <a:prstGeom prst="rect">
-              <a:avLst/>
-            </a:prstGeom>
-            <a:noFill/>
-          </p:spPr>
-          <p:txBody>
-            <a:bodyPr wrap="none" rtlCol="0">
-              <a:spAutoFit/>
-            </a:bodyPr>
-            <a:lstStyle/>
-            <a:p>
-              <a:r>
-                <a:rPr lang="en-US" sz="1000" dirty="0"/>
-                <a:t>t</a:t>
-              </a:r>
-              <a:r>
-                <a:rPr lang="en-US" sz="1000" dirty="0" smtClean="0"/>
-                <a:t>=52ms</a:t>
-              </a:r>
-            </a:p>
-            <a:p>
-              <a:endParaRPr lang="en-US" sz="1000" dirty="0"/>
-            </a:p>
-          </p:txBody>
-        </p:sp>
-      </p:grpSp>
-      <p:sp>
-        <p:nvSpPr>
-          <p:cNvPr id="20" name="TextBox 19"/>
+      <p:sp>
+        <p:nvSpPr>
+          <p:cNvPr id="19" name="TextBox 18"/>
           <p:cNvSpPr txBox="1"/>
           <p:nvPr/>
         </p:nvSpPr>
         <p:spPr>
           <a:xfrm>
-            <a:off x="3330640" y="452472"/>
-            <a:ext cx="2985763" cy="923330"/>
+            <a:off x="8569917" y="4847033"/>
+            <a:ext cx="574083" cy="400110"/>
           </a:xfrm>
           <a:prstGeom prst="rect">
             <a:avLst/>
@@ -5951,6 +5462,42 @@
           <a:lstStyle/>
           <a:p>
             <a:r>
+              <a:rPr lang="en-US" sz="1000" dirty="0"/>
+              <a:t>t</a:t>
+            </a:r>
+            <a:r>
+              <a:rPr lang="en-US" sz="1000" dirty="0" smtClean="0"/>
+              <a:t>=52ms</a:t>
+            </a:r>
+          </a:p>
+          <a:p>
+            <a:endParaRPr lang="en-US" sz="1000" dirty="0"/>
+          </a:p>
+        </p:txBody>
+      </p:sp>
+      <p:sp>
+        <p:nvSpPr>
+          <p:cNvPr id="20" name="TextBox 19"/>
+          <p:cNvSpPr txBox="1"/>
+          <p:nvPr/>
+        </p:nvSpPr>
+        <p:spPr>
+          <a:xfrm>
+            <a:off x="3330640" y="452472"/>
+            <a:ext cx="2985763" cy="923330"/>
+          </a:xfrm>
+          <a:prstGeom prst="rect">
+            <a:avLst/>
+          </a:prstGeom>
+          <a:noFill/>
+        </p:spPr>
+        <p:txBody>
+          <a:bodyPr wrap="none" rtlCol="0">
+            <a:spAutoFit/>
+          </a:bodyPr>
+          <a:lstStyle/>
+          <a:p>
+            <a:r>
               <a:rPr lang="en-US" dirty="0" smtClean="0"/>
               <a:t>Each stream event gets</a:t>
             </a:r>
@@ -5975,16 +5522,349 @@
       </p:sp>
       <p:sp>
         <p:nvSpPr>
-          <p:cNvPr id="23" name="Oval 22"/>
+          <p:cNvPr id="28" name="Rectangle 27"/>
           <p:cNvSpPr/>
           <p:nvPr/>
         </p:nvSpPr>
         <p:spPr>
           <a:xfrm>
-            <a:off x="2114437" y="3322901"/>
-            <a:ext cx="1181300" cy="1161970"/>
-          </a:xfrm>
-          <a:prstGeom prst="ellipse">
+            <a:off x="0" y="3733746"/>
+            <a:ext cx="574083" cy="246221"/>
+          </a:xfrm>
+          <a:prstGeom prst="rect">
+            <a:avLst/>
+          </a:prstGeom>
+        </p:spPr>
+        <p:txBody>
+          <a:bodyPr wrap="none">
+            <a:spAutoFit/>
+          </a:bodyPr>
+          <a:lstStyle/>
+          <a:p>
+            <a:r>
+              <a:rPr lang="en-US" sz="1000" dirty="0"/>
+              <a:t>t</a:t>
+            </a:r>
+            <a:r>
+              <a:rPr lang="en-US" sz="1000" dirty="0" smtClean="0"/>
+              <a:t>=96ms</a:t>
+            </a:r>
+            <a:endParaRPr lang="en-US" sz="1000" dirty="0"/>
+          </a:p>
+        </p:txBody>
+      </p:sp>
+      <p:sp>
+        <p:nvSpPr>
+          <p:cNvPr id="29" name="Rectangle 28"/>
+          <p:cNvSpPr/>
+          <p:nvPr/>
+        </p:nvSpPr>
+        <p:spPr>
+          <a:xfrm>
+            <a:off x="8486103" y="2711431"/>
+            <a:ext cx="658616" cy="246221"/>
+          </a:xfrm>
+          <a:prstGeom prst="rect">
+            <a:avLst/>
+          </a:prstGeom>
+        </p:spPr>
+        <p:txBody>
+          <a:bodyPr wrap="none">
+            <a:spAutoFit/>
+          </a:bodyPr>
+          <a:lstStyle/>
+          <a:p>
+            <a:r>
+              <a:rPr lang="en-US" sz="1000" dirty="0" smtClean="0"/>
+              <a:t>T=116ms</a:t>
+            </a:r>
+            <a:endParaRPr lang="en-US" sz="1000" dirty="0"/>
+          </a:p>
+        </p:txBody>
+      </p:sp>
+      <p:sp>
+        <p:nvSpPr>
+          <p:cNvPr id="30" name="TextBox 29"/>
+          <p:cNvSpPr txBox="1"/>
+          <p:nvPr/>
+        </p:nvSpPr>
+        <p:spPr>
+          <a:xfrm>
+            <a:off x="2767703" y="2565601"/>
+            <a:ext cx="2518638" cy="523220"/>
+          </a:xfrm>
+          <a:prstGeom prst="rect">
+            <a:avLst/>
+          </a:prstGeom>
+          <a:noFill/>
+        </p:spPr>
+        <p:txBody>
+          <a:bodyPr wrap="none" rtlCol="0">
+            <a:spAutoFit/>
+          </a:bodyPr>
+          <a:lstStyle/>
+          <a:p>
+            <a:r>
+              <a:rPr lang="en-US" sz="1400" dirty="0" smtClean="0"/>
+              <a:t>New events appear on top,</a:t>
+            </a:r>
+          </a:p>
+          <a:p>
+            <a:r>
+              <a:rPr lang="en-US" sz="1400" dirty="0" smtClean="0"/>
+              <a:t>Older events pushed downward</a:t>
+            </a:r>
+          </a:p>
+        </p:txBody>
+      </p:sp>
+      <p:cxnSp>
+        <p:nvCxnSpPr>
+          <p:cNvPr id="32" name="Straight Arrow Connector 31"/>
+          <p:cNvCxnSpPr/>
+          <p:nvPr/>
+        </p:nvCxnSpPr>
+        <p:spPr>
+          <a:xfrm>
+            <a:off x="5286341" y="2503320"/>
+            <a:ext cx="0" cy="811575"/>
+          </a:xfrm>
+          <a:prstGeom prst="straightConnector1">
+            <a:avLst/>
+          </a:prstGeom>
+          <a:ln>
+            <a:tailEnd type="arrow"/>
+          </a:ln>
+        </p:spPr>
+        <p:style>
+          <a:lnRef idx="2">
+            <a:schemeClr val="accent1"/>
+          </a:lnRef>
+          <a:fillRef idx="0">
+            <a:schemeClr val="accent1"/>
+          </a:fillRef>
+          <a:effectRef idx="1">
+            <a:schemeClr val="accent1"/>
+          </a:effectRef>
+          <a:fontRef idx="minor">
+            <a:schemeClr val="tx1"/>
+          </a:fontRef>
+        </p:style>
+      </p:cxnSp>
+      <p:sp>
+        <p:nvSpPr>
+          <p:cNvPr id="35" name="TextBox 34"/>
+          <p:cNvSpPr txBox="1"/>
+          <p:nvPr/>
+        </p:nvSpPr>
+        <p:spPr>
+          <a:xfrm>
+            <a:off x="2142010" y="1375802"/>
+            <a:ext cx="1450600" cy="861774"/>
+          </a:xfrm>
+          <a:prstGeom prst="rect">
+            <a:avLst/>
+          </a:prstGeom>
+          <a:noFill/>
+        </p:spPr>
+        <p:txBody>
+          <a:bodyPr wrap="none" rtlCol="0">
+            <a:spAutoFit/>
+          </a:bodyPr>
+          <a:lstStyle/>
+          <a:p>
+            <a:r>
+              <a:rPr lang="en-US" sz="1000" dirty="0" smtClean="0"/>
+              <a:t>Movement/</a:t>
+            </a:r>
+          </a:p>
+          <a:p>
+            <a:r>
+              <a:rPr lang="en-US" sz="1000" dirty="0" smtClean="0"/>
+              <a:t>Vibration/</a:t>
+            </a:r>
+          </a:p>
+          <a:p>
+            <a:r>
+              <a:rPr lang="en-US" sz="1000" dirty="0" smtClean="0"/>
+              <a:t>Color change to indicate</a:t>
+            </a:r>
+          </a:p>
+          <a:p>
+            <a:r>
+              <a:rPr lang="en-US" sz="1000" dirty="0" smtClean="0"/>
+              <a:t>active connection</a:t>
+            </a:r>
+          </a:p>
+          <a:p>
+            <a:endParaRPr lang="en-US" sz="1000" dirty="0" smtClean="0"/>
+          </a:p>
+        </p:txBody>
+      </p:sp>
+      <p:sp>
+        <p:nvSpPr>
+          <p:cNvPr id="36" name="TextBox 35"/>
+          <p:cNvSpPr txBox="1"/>
+          <p:nvPr/>
+        </p:nvSpPr>
+        <p:spPr>
+          <a:xfrm>
+            <a:off x="6914496" y="1691172"/>
+            <a:ext cx="1891864" cy="246221"/>
+          </a:xfrm>
+          <a:prstGeom prst="rect">
+            <a:avLst/>
+          </a:prstGeom>
+          <a:noFill/>
+        </p:spPr>
+        <p:txBody>
+          <a:bodyPr wrap="none" rtlCol="0">
+            <a:spAutoFit/>
+          </a:bodyPr>
+          <a:lstStyle/>
+          <a:p>
+            <a:r>
+              <a:rPr lang="en-US" sz="1000" dirty="0" smtClean="0"/>
+              <a:t>Bubbles “pop in” from off screen</a:t>
+            </a:r>
+            <a:endParaRPr lang="en-US" sz="1000" dirty="0"/>
+          </a:p>
+        </p:txBody>
+      </p:sp>
+      <p:sp>
+        <p:nvSpPr>
+          <p:cNvPr id="37" name="TextBox 36"/>
+          <p:cNvSpPr txBox="1"/>
+          <p:nvPr/>
+        </p:nvSpPr>
+        <p:spPr>
+          <a:xfrm>
+            <a:off x="4427936" y="92459"/>
+            <a:ext cx="717038" cy="276999"/>
+          </a:xfrm>
+          <a:prstGeom prst="rect">
+            <a:avLst/>
+          </a:prstGeom>
+          <a:noFill/>
+        </p:spPr>
+        <p:txBody>
+          <a:bodyPr wrap="none" rtlCol="0">
+            <a:spAutoFit/>
+          </a:bodyPr>
+          <a:lstStyle/>
+          <a:p>
+            <a:r>
+              <a:rPr lang="en-US" sz="1200" dirty="0" smtClean="0"/>
+              <a:t>V3.1 3/5</a:t>
+            </a:r>
+          </a:p>
+        </p:txBody>
+      </p:sp>
+      <p:sp>
+        <p:nvSpPr>
+          <p:cNvPr id="38" name="TextBox 37"/>
+          <p:cNvSpPr txBox="1"/>
+          <p:nvPr/>
+        </p:nvSpPr>
+        <p:spPr>
+          <a:xfrm>
+            <a:off x="5824068" y="5811015"/>
+            <a:ext cx="2036360" cy="646331"/>
+          </a:xfrm>
+          <a:prstGeom prst="rect">
+            <a:avLst/>
+          </a:prstGeom>
+          <a:noFill/>
+        </p:spPr>
+        <p:txBody>
+          <a:bodyPr wrap="none" rtlCol="0">
+            <a:spAutoFit/>
+          </a:bodyPr>
+          <a:lstStyle/>
+          <a:p>
+            <a:r>
+              <a:rPr lang="en-US" sz="1200" dirty="0" smtClean="0"/>
+              <a:t>Can click on individual bubble</a:t>
+            </a:r>
+            <a:br>
+              <a:rPr lang="en-US" sz="1200" dirty="0" smtClean="0"/>
+            </a:br>
+            <a:r>
+              <a:rPr lang="en-US" sz="1200" dirty="0" smtClean="0"/>
+              <a:t>for “focus” with more data</a:t>
+            </a:r>
+          </a:p>
+          <a:p>
+            <a:r>
+              <a:rPr lang="en-US" sz="1200" dirty="0" smtClean="0"/>
+              <a:t>(see slide on layout)</a:t>
+            </a:r>
+            <a:endParaRPr lang="en-US" sz="1200" dirty="0"/>
+          </a:p>
+        </p:txBody>
+      </p:sp>
+      <p:sp>
+        <p:nvSpPr>
+          <p:cNvPr id="3" name="Rectangle 2"/>
+          <p:cNvSpPr/>
+          <p:nvPr/>
+        </p:nvSpPr>
+        <p:spPr>
+          <a:xfrm>
+            <a:off x="292118" y="786862"/>
+            <a:ext cx="1512572" cy="1502612"/>
+          </a:xfrm>
+          <a:prstGeom prst="rect">
+            <a:avLst/>
+          </a:prstGeom>
+        </p:spPr>
+        <p:style>
+          <a:lnRef idx="2">
+            <a:schemeClr val="accent2">
+              <a:shade val="50000"/>
+            </a:schemeClr>
+          </a:lnRef>
+          <a:fillRef idx="1">
+            <a:schemeClr val="accent2"/>
+          </a:fillRef>
+          <a:effectRef idx="0">
+            <a:schemeClr val="accent2"/>
+          </a:effectRef>
+          <a:fontRef idx="minor">
+            <a:schemeClr val="lt1"/>
+          </a:fontRef>
+        </p:style>
+        <p:txBody>
+          <a:bodyPr rtlCol="0" anchor="ctr"/>
+          <a:lstStyle/>
+          <a:p>
+            <a:pPr algn="ctr"/>
+            <a:r>
+              <a:rPr lang="en-US" dirty="0" smtClean="0"/>
+              <a:t>Connection </a:t>
+            </a:r>
+          </a:p>
+          <a:p>
+            <a:pPr algn="ctr"/>
+            <a:r>
+              <a:rPr lang="en-US" dirty="0" smtClean="0"/>
+              <a:t>Open</a:t>
+            </a:r>
+            <a:endParaRPr lang="en-US" dirty="0"/>
+          </a:p>
+        </p:txBody>
+      </p:sp>
+      <p:sp>
+        <p:nvSpPr>
+          <p:cNvPr id="8" name="Rectangle 7"/>
+          <p:cNvSpPr/>
+          <p:nvPr/>
+        </p:nvSpPr>
+        <p:spPr>
+          <a:xfrm>
+            <a:off x="591204" y="3314895"/>
+            <a:ext cx="914400" cy="914400"/>
+          </a:xfrm>
+          <a:prstGeom prst="rect">
             <a:avLst/>
           </a:prstGeom>
         </p:spPr>
@@ -6008,36 +5888,32 @@
           <a:p>
             <a:pPr algn="ctr"/>
             <a:r>
-              <a:rPr lang="en-US" sz="1400" dirty="0" smtClean="0"/>
+              <a:rPr lang="en-US" dirty="0" smtClean="0"/>
               <a:t>Send</a:t>
             </a:r>
           </a:p>
           <a:p>
             <a:pPr algn="ctr"/>
             <a:r>
-              <a:rPr lang="en-US" sz="1400" dirty="0" smtClean="0"/>
-              <a:t>Settings</a:t>
-            </a:r>
-            <a:endParaRPr lang="en-US" sz="1400" dirty="0" smtClean="0"/>
-          </a:p>
-          <a:p>
-            <a:pPr algn="ctr"/>
-            <a:endParaRPr lang="en-US" sz="1400" dirty="0" smtClean="0"/>
-          </a:p>
-        </p:txBody>
-      </p:sp>
-      <p:sp>
-        <p:nvSpPr>
-          <p:cNvPr id="24" name="Oval 23"/>
+              <a:rPr lang="en-US" dirty="0" smtClean="0"/>
+              <a:t>Header</a:t>
+            </a:r>
+            <a:endParaRPr lang="en-US" dirty="0"/>
+          </a:p>
+        </p:txBody>
+      </p:sp>
+      <p:sp>
+        <p:nvSpPr>
+          <p:cNvPr id="9" name="Rectangle 8"/>
           <p:cNvSpPr/>
           <p:nvPr/>
         </p:nvSpPr>
         <p:spPr>
           <a:xfrm>
-            <a:off x="574083" y="3103148"/>
-            <a:ext cx="1540354" cy="1381723"/>
-          </a:xfrm>
-          <a:prstGeom prst="ellipse">
+            <a:off x="1657418" y="3193784"/>
+            <a:ext cx="1266675" cy="1140474"/>
+          </a:xfrm>
+          <a:prstGeom prst="rect">
             <a:avLst/>
           </a:prstGeom>
         </p:spPr>
@@ -6061,36 +5937,28 @@
           <a:p>
             <a:pPr algn="ctr"/>
             <a:r>
-              <a:rPr lang="en-US" sz="1400" dirty="0" smtClean="0"/>
-              <a:t>Send</a:t>
+              <a:rPr lang="en-US" dirty="0" smtClean="0"/>
+              <a:t>Send Settings</a:t>
             </a:r>
           </a:p>
           <a:p>
             <a:pPr algn="ctr"/>
-            <a:r>
-              <a:rPr lang="en-US" sz="1400" dirty="0" smtClean="0"/>
-              <a:t>Header</a:t>
-            </a:r>
-            <a:endParaRPr lang="en-US" sz="1400" dirty="0" smtClean="0"/>
-          </a:p>
-          <a:p>
-            <a:pPr algn="ctr"/>
-            <a:endParaRPr lang="en-US" sz="1400" dirty="0" smtClean="0"/>
-          </a:p>
-        </p:txBody>
-      </p:sp>
-      <p:sp>
-        <p:nvSpPr>
-          <p:cNvPr id="26" name="Oval 25"/>
+            <a:endParaRPr lang="en-US" dirty="0"/>
+          </a:p>
+        </p:txBody>
+      </p:sp>
+      <p:sp>
+        <p:nvSpPr>
+          <p:cNvPr id="15" name="Rectangle 14"/>
           <p:cNvSpPr/>
           <p:nvPr/>
         </p:nvSpPr>
         <p:spPr>
           <a:xfrm>
-            <a:off x="6717663" y="2060505"/>
-            <a:ext cx="1768440" cy="1540399"/>
-          </a:xfrm>
-          <a:prstGeom prst="ellipse">
+            <a:off x="6000096" y="2400495"/>
+            <a:ext cx="914400" cy="914400"/>
+          </a:xfrm>
+          <a:prstGeom prst="rect">
             <a:avLst/>
           </a:prstGeom>
         </p:spPr>
@@ -6117,7 +5985,14 @@
             <a:pPr algn="ctr"/>
             <a:r>
               <a:rPr lang="en-US" dirty="0" smtClean="0"/>
-              <a:t>Data</a:t>
+              <a:t>Update</a:t>
+            </a:r>
+          </a:p>
+          <a:p>
+            <a:pPr algn="ctr"/>
+            <a:r>
+              <a:rPr lang="en-US" dirty="0" smtClean="0"/>
+              <a:t>Settings</a:t>
             </a:r>
           </a:p>
           <a:p>
@@ -6128,16 +6003,16 @@
       </p:sp>
       <p:sp>
         <p:nvSpPr>
-          <p:cNvPr id="27" name="Oval 26"/>
+          <p:cNvPr id="25" name="Rectangle 24"/>
           <p:cNvSpPr/>
           <p:nvPr/>
         </p:nvSpPr>
         <p:spPr>
           <a:xfrm>
-            <a:off x="5872201" y="2446509"/>
-            <a:ext cx="845462" cy="747275"/>
-          </a:xfrm>
-          <a:prstGeom prst="ellipse">
+            <a:off x="7022889" y="2104661"/>
+            <a:ext cx="1403132" cy="1434896"/>
+          </a:xfrm>
+          <a:prstGeom prst="rect">
             <a:avLst/>
           </a:prstGeom>
         </p:spPr>
@@ -6163,173 +6038,39 @@
           <a:p>
             <a:pPr algn="ctr"/>
             <a:r>
-              <a:rPr lang="en-US" sz="1000" dirty="0" smtClean="0"/>
-              <a:t>Update Setting</a:t>
-            </a:r>
-            <a:endParaRPr lang="en-US" sz="1000" dirty="0" smtClean="0"/>
-          </a:p>
-          <a:p>
-            <a:pPr algn="ctr"/>
-            <a:endParaRPr lang="en-US" sz="1000" dirty="0"/>
-          </a:p>
-        </p:txBody>
-      </p:sp>
-      <p:sp>
-        <p:nvSpPr>
-          <p:cNvPr id="28" name="Rectangle 27"/>
+              <a:rPr lang="en-US" dirty="0" smtClean="0"/>
+              <a:t>Data</a:t>
+            </a:r>
+            <a:endParaRPr lang="en-US" dirty="0"/>
+          </a:p>
+        </p:txBody>
+      </p:sp>
+      <p:sp>
+        <p:nvSpPr>
+          <p:cNvPr id="33" name="Rectangle 32"/>
           <p:cNvSpPr/>
           <p:nvPr/>
         </p:nvSpPr>
         <p:spPr>
           <a:xfrm>
-            <a:off x="0" y="3733746"/>
-            <a:ext cx="574083" cy="246221"/>
+            <a:off x="3930559" y="4645443"/>
+            <a:ext cx="610233" cy="601700"/>
           </a:xfrm>
           <a:prstGeom prst="rect">
             <a:avLst/>
           </a:prstGeom>
         </p:spPr>
-        <p:txBody>
-          <a:bodyPr wrap="none">
-            <a:spAutoFit/>
-          </a:bodyPr>
-          <a:lstStyle/>
-          <a:p>
-            <a:r>
-              <a:rPr lang="en-US" sz="1000" dirty="0"/>
-              <a:t>t</a:t>
-            </a:r>
-            <a:r>
-              <a:rPr lang="en-US" sz="1000" dirty="0" smtClean="0"/>
-              <a:t>=96ms</a:t>
-            </a:r>
-            <a:endParaRPr lang="en-US" sz="1000" dirty="0"/>
-          </a:p>
-        </p:txBody>
-      </p:sp>
-      <p:sp>
-        <p:nvSpPr>
-          <p:cNvPr id="29" name="Rectangle 28"/>
-          <p:cNvSpPr/>
-          <p:nvPr/>
-        </p:nvSpPr>
-        <p:spPr>
-          <a:xfrm>
-            <a:off x="8486103" y="2711431"/>
-            <a:ext cx="658616" cy="246221"/>
-          </a:xfrm>
-          <a:prstGeom prst="rect">
-            <a:avLst/>
-          </a:prstGeom>
-        </p:spPr>
-        <p:txBody>
-          <a:bodyPr wrap="none">
-            <a:spAutoFit/>
-          </a:bodyPr>
-          <a:lstStyle/>
-          <a:p>
-            <a:r>
-              <a:rPr lang="en-US" sz="1000" dirty="0" smtClean="0"/>
-              <a:t>T=116ms</a:t>
-            </a:r>
-            <a:endParaRPr lang="en-US" sz="1000" dirty="0"/>
-          </a:p>
-        </p:txBody>
-      </p:sp>
-      <p:sp>
-        <p:nvSpPr>
-          <p:cNvPr id="30" name="TextBox 29"/>
-          <p:cNvSpPr txBox="1"/>
-          <p:nvPr/>
-        </p:nvSpPr>
-        <p:spPr>
-          <a:xfrm>
-            <a:off x="2767703" y="2565601"/>
-            <a:ext cx="2518638" cy="523220"/>
-          </a:xfrm>
-          <a:prstGeom prst="rect">
-            <a:avLst/>
-          </a:prstGeom>
-          <a:noFill/>
-        </p:spPr>
-        <p:txBody>
-          <a:bodyPr wrap="none" rtlCol="0">
-            <a:spAutoFit/>
-          </a:bodyPr>
-          <a:lstStyle/>
-          <a:p>
-            <a:r>
-              <a:rPr lang="en-US" sz="1400" dirty="0" smtClean="0"/>
-              <a:t>New events appear on top,</a:t>
-            </a:r>
-          </a:p>
-          <a:p>
-            <a:r>
-              <a:rPr lang="en-US" sz="1400" dirty="0" smtClean="0"/>
-              <a:t>Older events pushed downward</a:t>
-            </a:r>
-          </a:p>
-        </p:txBody>
-      </p:sp>
-      <p:cxnSp>
-        <p:nvCxnSpPr>
-          <p:cNvPr id="32" name="Straight Arrow Connector 31"/>
-          <p:cNvCxnSpPr/>
-          <p:nvPr/>
-        </p:nvCxnSpPr>
-        <p:spPr>
-          <a:xfrm>
-            <a:off x="5286341" y="2503320"/>
-            <a:ext cx="0" cy="811575"/>
-          </a:xfrm>
-          <a:prstGeom prst="straightConnector1">
-            <a:avLst/>
-          </a:prstGeom>
-          <a:ln>
-            <a:tailEnd type="arrow"/>
-          </a:ln>
-        </p:spPr>
         <p:style>
           <a:lnRef idx="2">
-            <a:schemeClr val="accent1"/>
-          </a:lnRef>
-          <a:fillRef idx="0">
-            <a:schemeClr val="accent1"/>
-          </a:fillRef>
-          <a:effectRef idx="1">
-            <a:schemeClr val="accent1"/>
-          </a:effectRef>
-          <a:fontRef idx="minor">
-            <a:schemeClr val="tx1"/>
-          </a:fontRef>
-        </p:style>
-      </p:cxnSp>
-      <p:sp>
-        <p:nvSpPr>
-          <p:cNvPr id="34" name="Oval 33"/>
-          <p:cNvSpPr/>
-          <p:nvPr/>
-        </p:nvSpPr>
-        <p:spPr>
-          <a:xfrm>
-            <a:off x="592448" y="1186058"/>
-            <a:ext cx="1578718" cy="1379543"/>
-          </a:xfrm>
-          <a:prstGeom prst="ellipse">
-            <a:avLst/>
-          </a:prstGeom>
-        </p:spPr>
-        <p:style>
-          <a:lnRef idx="2">
-            <a:schemeClr val="accent2">
+            <a:schemeClr val="accent3">
               <a:shade val="50000"/>
             </a:schemeClr>
           </a:lnRef>
           <a:fillRef idx="1">
-            <a:schemeClr val="accent2"/>
+            <a:schemeClr val="accent3"/>
           </a:fillRef>
           <a:effectRef idx="0">
-            <a:schemeClr val="accent2"/>
+            <a:schemeClr val="accent3"/>
           </a:effectRef>
           <a:fontRef idx="minor">
             <a:schemeClr val="lt1"/>
@@ -6341,34 +6082,331 @@
           <a:p>
             <a:pPr algn="ctr"/>
             <a:r>
-              <a:rPr lang="en-US" sz="1400" dirty="0" smtClean="0"/>
-              <a:t>Connection</a:t>
+              <a:rPr lang="en-US" sz="1000" dirty="0" smtClean="0"/>
+              <a:t>Update</a:t>
             </a:r>
           </a:p>
           <a:p>
             <a:pPr algn="ctr"/>
             <a:r>
-              <a:rPr lang="en-US" sz="1400" dirty="0" smtClean="0"/>
-              <a:t>Open</a:t>
-            </a:r>
-            <a:endParaRPr lang="en-US" sz="1400" dirty="0" smtClean="0"/>
+              <a:rPr lang="en-US" sz="1000" dirty="0" smtClean="0"/>
+              <a:t>Settings</a:t>
+            </a:r>
           </a:p>
           <a:p>
             <a:pPr algn="ctr"/>
-            <a:endParaRPr lang="en-US" sz="1400" dirty="0" smtClean="0"/>
-          </a:p>
-        </p:txBody>
-      </p:sp>
-      <p:sp>
-        <p:nvSpPr>
-          <p:cNvPr id="35" name="TextBox 34"/>
+            <a:endParaRPr lang="en-US" sz="1000" dirty="0"/>
+          </a:p>
+        </p:txBody>
+      </p:sp>
+      <p:sp>
+        <p:nvSpPr>
+          <p:cNvPr id="39" name="Rectangle 38"/>
+          <p:cNvSpPr/>
+          <p:nvPr/>
+        </p:nvSpPr>
+        <p:spPr>
+          <a:xfrm>
+            <a:off x="4760103" y="4529991"/>
+            <a:ext cx="795657" cy="772207"/>
+          </a:xfrm>
+          <a:prstGeom prst="rect">
+            <a:avLst/>
+          </a:prstGeom>
+        </p:spPr>
+        <p:style>
+          <a:lnRef idx="2">
+            <a:schemeClr val="accent3">
+              <a:shade val="50000"/>
+            </a:schemeClr>
+          </a:lnRef>
+          <a:fillRef idx="1">
+            <a:schemeClr val="accent3"/>
+          </a:fillRef>
+          <a:effectRef idx="0">
+            <a:schemeClr val="accent3"/>
+          </a:effectRef>
+          <a:fontRef idx="minor">
+            <a:schemeClr val="lt1"/>
+          </a:fontRef>
+        </p:style>
+        <p:txBody>
+          <a:bodyPr rtlCol="0" anchor="ctr"/>
+          <a:lstStyle/>
+          <a:p>
+            <a:pPr algn="ctr"/>
+            <a:r>
+              <a:rPr lang="en-US" sz="1000" dirty="0" smtClean="0"/>
+              <a:t>Send</a:t>
+            </a:r>
+          </a:p>
+          <a:p>
+            <a:pPr algn="ctr"/>
+            <a:r>
+              <a:rPr lang="en-US" sz="1000" dirty="0" smtClean="0"/>
+              <a:t>Header</a:t>
+            </a:r>
+          </a:p>
+          <a:p>
+            <a:pPr algn="ctr"/>
+            <a:endParaRPr lang="en-US" sz="1000" dirty="0"/>
+          </a:p>
+        </p:txBody>
+      </p:sp>
+      <p:sp>
+        <p:nvSpPr>
+          <p:cNvPr id="40" name="Rectangle 39"/>
+          <p:cNvSpPr/>
+          <p:nvPr/>
+        </p:nvSpPr>
+        <p:spPr>
+          <a:xfrm>
+            <a:off x="5676405" y="3951269"/>
+            <a:ext cx="1891864" cy="1859746"/>
+          </a:xfrm>
+          <a:prstGeom prst="rect">
+            <a:avLst/>
+          </a:prstGeom>
+        </p:spPr>
+        <p:style>
+          <a:lnRef idx="2">
+            <a:schemeClr val="accent3">
+              <a:shade val="50000"/>
+            </a:schemeClr>
+          </a:lnRef>
+          <a:fillRef idx="1">
+            <a:schemeClr val="accent3"/>
+          </a:fillRef>
+          <a:effectRef idx="0">
+            <a:schemeClr val="accent3"/>
+          </a:effectRef>
+          <a:fontRef idx="minor">
+            <a:schemeClr val="lt1"/>
+          </a:fontRef>
+        </p:style>
+        <p:txBody>
+          <a:bodyPr rtlCol="0" anchor="ctr"/>
+          <a:lstStyle/>
+          <a:p>
+            <a:pPr algn="ctr"/>
+            <a:r>
+              <a:rPr lang="en-US" sz="1000" dirty="0" smtClean="0"/>
+              <a:t>Data</a:t>
+            </a:r>
+          </a:p>
+          <a:p>
+            <a:pPr algn="ctr"/>
+            <a:endParaRPr lang="en-US" sz="1000" dirty="0"/>
+          </a:p>
+        </p:txBody>
+      </p:sp>
+      <p:sp>
+        <p:nvSpPr>
+          <p:cNvPr id="41" name="Rectangle 40"/>
+          <p:cNvSpPr/>
+          <p:nvPr/>
+        </p:nvSpPr>
+        <p:spPr>
+          <a:xfrm>
+            <a:off x="7655517" y="4529991"/>
+            <a:ext cx="914400" cy="914400"/>
+          </a:xfrm>
+          <a:prstGeom prst="rect">
+            <a:avLst/>
+          </a:prstGeom>
+        </p:spPr>
+        <p:style>
+          <a:lnRef idx="2">
+            <a:schemeClr val="accent3">
+              <a:shade val="50000"/>
+            </a:schemeClr>
+          </a:lnRef>
+          <a:fillRef idx="1">
+            <a:schemeClr val="accent3"/>
+          </a:fillRef>
+          <a:effectRef idx="0">
+            <a:schemeClr val="accent3"/>
+          </a:effectRef>
+          <a:fontRef idx="minor">
+            <a:schemeClr val="lt1"/>
+          </a:fontRef>
+        </p:style>
+        <p:txBody>
+          <a:bodyPr rtlCol="0" anchor="ctr"/>
+          <a:lstStyle/>
+          <a:p>
+            <a:pPr algn="ctr"/>
+            <a:r>
+              <a:rPr lang="en-US" sz="1000" dirty="0" smtClean="0"/>
+              <a:t>Ping</a:t>
+            </a:r>
+          </a:p>
+        </p:txBody>
+      </p:sp>
+      <p:sp>
+        <p:nvSpPr>
+          <p:cNvPr id="43" name="Rectangle 42"/>
+          <p:cNvSpPr/>
+          <p:nvPr/>
+        </p:nvSpPr>
+        <p:spPr>
+          <a:xfrm>
+            <a:off x="44853" y="5965029"/>
+            <a:ext cx="435636" cy="246221"/>
+          </a:xfrm>
+          <a:prstGeom prst="rect">
+            <a:avLst/>
+          </a:prstGeom>
+        </p:spPr>
+        <p:txBody>
+          <a:bodyPr wrap="none">
+            <a:spAutoFit/>
+          </a:bodyPr>
+          <a:lstStyle/>
+          <a:p>
+            <a:r>
+              <a:rPr lang="en-US" sz="1000" dirty="0" smtClean="0"/>
+              <a:t>Start</a:t>
+            </a:r>
+            <a:endParaRPr lang="en-US" sz="1000" dirty="0"/>
+          </a:p>
+        </p:txBody>
+      </p:sp>
+      <p:sp>
+        <p:nvSpPr>
+          <p:cNvPr id="44" name="Rectangle 43"/>
+          <p:cNvSpPr/>
+          <p:nvPr/>
+        </p:nvSpPr>
+        <p:spPr>
+          <a:xfrm>
+            <a:off x="480489" y="5302198"/>
+            <a:ext cx="1493491" cy="1423217"/>
+          </a:xfrm>
+          <a:prstGeom prst="rect">
+            <a:avLst/>
+          </a:prstGeom>
+        </p:spPr>
+        <p:style>
+          <a:lnRef idx="1">
+            <a:schemeClr val="accent1"/>
+          </a:lnRef>
+          <a:fillRef idx="3">
+            <a:schemeClr val="accent1"/>
+          </a:fillRef>
+          <a:effectRef idx="2">
+            <a:schemeClr val="accent1"/>
+          </a:effectRef>
+          <a:fontRef idx="minor">
+            <a:schemeClr val="lt1"/>
+          </a:fontRef>
+        </p:style>
+        <p:txBody>
+          <a:bodyPr rtlCol="0" anchor="ctr"/>
+          <a:lstStyle/>
+          <a:p>
+            <a:pPr algn="ctr"/>
+            <a:r>
+              <a:rPr lang="en-US" sz="1000" dirty="0" smtClean="0"/>
+              <a:t>Send Header</a:t>
+            </a:r>
+            <a:endParaRPr lang="en-US" sz="1000" dirty="0"/>
+          </a:p>
+        </p:txBody>
+      </p:sp>
+      <p:sp>
+        <p:nvSpPr>
+          <p:cNvPr id="45" name="Rectangle 44"/>
+          <p:cNvSpPr/>
+          <p:nvPr/>
+        </p:nvSpPr>
+        <p:spPr>
+          <a:xfrm>
+            <a:off x="2123209" y="5591950"/>
+            <a:ext cx="949450" cy="889844"/>
+          </a:xfrm>
+          <a:prstGeom prst="rect">
+            <a:avLst/>
+          </a:prstGeom>
+        </p:spPr>
+        <p:style>
+          <a:lnRef idx="1">
+            <a:schemeClr val="accent1"/>
+          </a:lnRef>
+          <a:fillRef idx="3">
+            <a:schemeClr val="accent1"/>
+          </a:fillRef>
+          <a:effectRef idx="2">
+            <a:schemeClr val="accent1"/>
+          </a:effectRef>
+          <a:fontRef idx="minor">
+            <a:schemeClr val="lt1"/>
+          </a:fontRef>
+        </p:style>
+        <p:txBody>
+          <a:bodyPr rtlCol="0" anchor="ctr"/>
+          <a:lstStyle/>
+          <a:p>
+            <a:pPr algn="ctr"/>
+            <a:r>
+              <a:rPr lang="en-US" sz="1000" dirty="0" smtClean="0"/>
+              <a:t>Update Window</a:t>
+            </a:r>
+          </a:p>
+        </p:txBody>
+      </p:sp>
+      <p:sp>
+        <p:nvSpPr>
+          <p:cNvPr id="46" name="Rectangle 45"/>
+          <p:cNvSpPr/>
+          <p:nvPr/>
+        </p:nvSpPr>
+        <p:spPr>
+          <a:xfrm>
+            <a:off x="3183038" y="5673706"/>
+            <a:ext cx="819143" cy="699622"/>
+          </a:xfrm>
+          <a:prstGeom prst="rect">
+            <a:avLst/>
+          </a:prstGeom>
+        </p:spPr>
+        <p:style>
+          <a:lnRef idx="1">
+            <a:schemeClr val="accent1"/>
+          </a:lnRef>
+          <a:fillRef idx="3">
+            <a:schemeClr val="accent1"/>
+          </a:fillRef>
+          <a:effectRef idx="2">
+            <a:schemeClr val="accent1"/>
+          </a:effectRef>
+          <a:fontRef idx="minor">
+            <a:schemeClr val="lt1"/>
+          </a:fontRef>
+        </p:style>
+        <p:txBody>
+          <a:bodyPr rtlCol="0" anchor="ctr"/>
+          <a:lstStyle/>
+          <a:p>
+            <a:pPr algn="ctr"/>
+            <a:r>
+              <a:rPr lang="en-US" sz="1000" dirty="0" smtClean="0"/>
+              <a:t>Update Settings</a:t>
+            </a:r>
+            <a:endParaRPr lang="en-US" sz="1000" dirty="0"/>
+          </a:p>
+        </p:txBody>
+      </p:sp>
+      <p:sp>
+        <p:nvSpPr>
+          <p:cNvPr id="47" name="TextBox 46"/>
           <p:cNvSpPr txBox="1"/>
           <p:nvPr/>
         </p:nvSpPr>
         <p:spPr>
           <a:xfrm>
-            <a:off x="2142010" y="1375802"/>
-            <a:ext cx="1450600" cy="861774"/>
+            <a:off x="687583" y="4415362"/>
+            <a:ext cx="2236510" cy="400110"/>
           </a:xfrm>
           <a:prstGeom prst="rect">
             <a:avLst/>
@@ -6383,132 +6421,16 @@
           <a:p>
             <a:r>
               <a:rPr lang="en-US" sz="1000" dirty="0" smtClean="0"/>
-              <a:t>Movement/</a:t>
-            </a:r>
-          </a:p>
-          <a:p>
-            <a:r>
+              <a:t>Boxes centered, don’t want this to look </a:t>
+            </a:r>
+            <a:br>
               <a:rPr lang="en-US" sz="1000" dirty="0" smtClean="0"/>
-              <a:t>Vibration/</a:t>
-            </a:r>
-          </a:p>
-          <a:p>
+            </a:br>
             <a:r>
               <a:rPr lang="en-US" sz="1000" dirty="0" smtClean="0"/>
-              <a:t>Color change to indicate</a:t>
-            </a:r>
-          </a:p>
-          <a:p>
-            <a:r>
-              <a:rPr lang="en-US" sz="1000" dirty="0" smtClean="0"/>
-              <a:t>active connection</a:t>
-            </a:r>
-          </a:p>
-          <a:p>
-            <a:endParaRPr lang="en-US" sz="1000" dirty="0" smtClean="0"/>
-          </a:p>
-        </p:txBody>
-      </p:sp>
-      <p:sp>
-        <p:nvSpPr>
-          <p:cNvPr id="36" name="TextBox 35"/>
-          <p:cNvSpPr txBox="1"/>
-          <p:nvPr/>
-        </p:nvSpPr>
-        <p:spPr>
-          <a:xfrm>
-            <a:off x="6914496" y="1691172"/>
-            <a:ext cx="1891864" cy="246221"/>
-          </a:xfrm>
-          <a:prstGeom prst="rect">
-            <a:avLst/>
-          </a:prstGeom>
-          <a:noFill/>
-        </p:spPr>
-        <p:txBody>
-          <a:bodyPr wrap="none" rtlCol="0">
-            <a:spAutoFit/>
-          </a:bodyPr>
-          <a:lstStyle/>
-          <a:p>
-            <a:r>
-              <a:rPr lang="en-US" sz="1000" dirty="0" smtClean="0"/>
-              <a:t>Bubbles “pop in” from off screen</a:t>
+              <a:t>like a bar chart</a:t>
             </a:r>
             <a:endParaRPr lang="en-US" sz="1000" dirty="0"/>
-          </a:p>
-        </p:txBody>
-      </p:sp>
-      <p:sp>
-        <p:nvSpPr>
-          <p:cNvPr id="37" name="TextBox 36"/>
-          <p:cNvSpPr txBox="1"/>
-          <p:nvPr/>
-        </p:nvSpPr>
-        <p:spPr>
-          <a:xfrm>
-            <a:off x="4427936" y="92459"/>
-            <a:ext cx="332167" cy="276999"/>
-          </a:xfrm>
-          <a:prstGeom prst="rect">
-            <a:avLst/>
-          </a:prstGeom>
-          <a:noFill/>
-        </p:spPr>
-        <p:txBody>
-          <a:bodyPr wrap="none" rtlCol="0">
-            <a:spAutoFit/>
-          </a:bodyPr>
-          <a:lstStyle/>
-          <a:p>
-            <a:r>
-              <a:rPr lang="en-US" sz="1200" dirty="0" smtClean="0"/>
-              <a:t>v3</a:t>
-            </a:r>
-            <a:endParaRPr lang="en-US" sz="1200" dirty="0"/>
-          </a:p>
-        </p:txBody>
-      </p:sp>
-      <p:sp>
-        <p:nvSpPr>
-          <p:cNvPr id="38" name="TextBox 37"/>
-          <p:cNvSpPr txBox="1"/>
-          <p:nvPr/>
-        </p:nvSpPr>
-        <p:spPr>
-          <a:xfrm>
-            <a:off x="5824068" y="5811015"/>
-            <a:ext cx="2036360" cy="646331"/>
-          </a:xfrm>
-          <a:prstGeom prst="rect">
-            <a:avLst/>
-          </a:prstGeom>
-          <a:noFill/>
-        </p:spPr>
-        <p:txBody>
-          <a:bodyPr wrap="none" rtlCol="0">
-            <a:spAutoFit/>
-          </a:bodyPr>
-          <a:lstStyle/>
-          <a:p>
-            <a:r>
-              <a:rPr lang="en-US" sz="1200" dirty="0" smtClean="0"/>
-              <a:t>Can click on individual bubble</a:t>
-            </a:r>
-            <a:br>
-              <a:rPr lang="en-US" sz="1200" dirty="0" smtClean="0"/>
-            </a:br>
-            <a:r>
-              <a:rPr lang="en-US" sz="1200" dirty="0" smtClean="0"/>
-              <a:t>for “focus” with more data</a:t>
-            </a:r>
-          </a:p>
-          <a:p>
-            <a:r>
-              <a:rPr lang="en-US" sz="1200" dirty="0" smtClean="0"/>
-              <a:t>(see slide on layout)</a:t>
-            </a:r>
-            <a:endParaRPr lang="en-US" sz="1200" dirty="0"/>
           </a:p>
         </p:txBody>
       </p:sp>

</xml_diff>